<commit_message>
size fit for new parameter set
</commit_message>
<xml_diff>
--- a/figure-assembly/figure-1.pptx
+++ b/figure-assembly/figure-1.pptx
@@ -243,7 +243,7 @@
           <a:p>
             <a:fld id="{25EC0CD3-564D-9742-98B5-86271438CCE6}" type="datetimeFigureOut">
               <a:rPr lang="en-US" smtClean="0"/>
-              <a:t>10/30/18</a:t>
+              <a:t>11/11/18</a:t>
             </a:fld>
             <a:endParaRPr lang="en-US"/>
           </a:p>
@@ -413,7 +413,7 @@
           <a:p>
             <a:fld id="{25EC0CD3-564D-9742-98B5-86271438CCE6}" type="datetimeFigureOut">
               <a:rPr lang="en-US" smtClean="0"/>
-              <a:t>10/30/18</a:t>
+              <a:t>11/11/18</a:t>
             </a:fld>
             <a:endParaRPr lang="en-US"/>
           </a:p>
@@ -593,7 +593,7 @@
           <a:p>
             <a:fld id="{25EC0CD3-564D-9742-98B5-86271438CCE6}" type="datetimeFigureOut">
               <a:rPr lang="en-US" smtClean="0"/>
-              <a:t>10/30/18</a:t>
+              <a:t>11/11/18</a:t>
             </a:fld>
             <a:endParaRPr lang="en-US"/>
           </a:p>
@@ -763,7 +763,7 @@
           <a:p>
             <a:fld id="{25EC0CD3-564D-9742-98B5-86271438CCE6}" type="datetimeFigureOut">
               <a:rPr lang="en-US" smtClean="0"/>
-              <a:t>10/30/18</a:t>
+              <a:t>11/11/18</a:t>
             </a:fld>
             <a:endParaRPr lang="en-US"/>
           </a:p>
@@ -1007,7 +1007,7 @@
           <a:p>
             <a:fld id="{25EC0CD3-564D-9742-98B5-86271438CCE6}" type="datetimeFigureOut">
               <a:rPr lang="en-US" smtClean="0"/>
-              <a:t>10/30/18</a:t>
+              <a:t>11/11/18</a:t>
             </a:fld>
             <a:endParaRPr lang="en-US"/>
           </a:p>
@@ -1239,7 +1239,7 @@
           <a:p>
             <a:fld id="{25EC0CD3-564D-9742-98B5-86271438CCE6}" type="datetimeFigureOut">
               <a:rPr lang="en-US" smtClean="0"/>
-              <a:t>10/30/18</a:t>
+              <a:t>11/11/18</a:t>
             </a:fld>
             <a:endParaRPr lang="en-US"/>
           </a:p>
@@ -1606,7 +1606,7 @@
           <a:p>
             <a:fld id="{25EC0CD3-564D-9742-98B5-86271438CCE6}" type="datetimeFigureOut">
               <a:rPr lang="en-US" smtClean="0"/>
-              <a:t>10/30/18</a:t>
+              <a:t>11/11/18</a:t>
             </a:fld>
             <a:endParaRPr lang="en-US"/>
           </a:p>
@@ -1724,7 +1724,7 @@
           <a:p>
             <a:fld id="{25EC0CD3-564D-9742-98B5-86271438CCE6}" type="datetimeFigureOut">
               <a:rPr lang="en-US" smtClean="0"/>
-              <a:t>10/30/18</a:t>
+              <a:t>11/11/18</a:t>
             </a:fld>
             <a:endParaRPr lang="en-US"/>
           </a:p>
@@ -1819,7 +1819,7 @@
           <a:p>
             <a:fld id="{25EC0CD3-564D-9742-98B5-86271438CCE6}" type="datetimeFigureOut">
               <a:rPr lang="en-US" smtClean="0"/>
-              <a:t>10/30/18</a:t>
+              <a:t>11/11/18</a:t>
             </a:fld>
             <a:endParaRPr lang="en-US"/>
           </a:p>
@@ -2096,7 +2096,7 @@
           <a:p>
             <a:fld id="{25EC0CD3-564D-9742-98B5-86271438CCE6}" type="datetimeFigureOut">
               <a:rPr lang="en-US" smtClean="0"/>
-              <a:t>10/30/18</a:t>
+              <a:t>11/11/18</a:t>
             </a:fld>
             <a:endParaRPr lang="en-US"/>
           </a:p>
@@ -2353,7 +2353,7 @@
           <a:p>
             <a:fld id="{25EC0CD3-564D-9742-98B5-86271438CCE6}" type="datetimeFigureOut">
               <a:rPr lang="en-US" smtClean="0"/>
-              <a:t>10/30/18</a:t>
+              <a:t>11/11/18</a:t>
             </a:fld>
             <a:endParaRPr lang="en-US"/>
           </a:p>
@@ -2566,7 +2566,7 @@
           <a:p>
             <a:fld id="{25EC0CD3-564D-9742-98B5-86271438CCE6}" type="datetimeFigureOut">
               <a:rPr lang="en-US" smtClean="0"/>
-              <a:t>10/30/18</a:t>
+              <a:t>11/11/18</a:t>
             </a:fld>
             <a:endParaRPr lang="en-US"/>
           </a:p>
@@ -2973,6 +2973,66 @@
       </p:grpSpPr>
       <p:pic>
         <p:nvPicPr>
+          <p:cNvPr id="18" name="Picture 17">
+            <a:extLst>
+              <a:ext uri="{FF2B5EF4-FFF2-40B4-BE49-F238E27FC236}">
+                <a16:creationId xmlns:a16="http://schemas.microsoft.com/office/drawing/2014/main" id="{050D7499-21DE-764E-8D88-D7A51A879F8A}"/>
+              </a:ext>
+            </a:extLst>
+          </p:cNvPr>
+          <p:cNvPicPr>
+            <a:picLocks noChangeAspect="1"/>
+          </p:cNvPicPr>
+          <p:nvPr/>
+        </p:nvPicPr>
+        <p:blipFill>
+          <a:blip r:embed="rId2"/>
+          <a:stretch>
+            <a:fillRect/>
+          </a:stretch>
+        </p:blipFill>
+        <p:spPr>
+          <a:xfrm>
+            <a:off x="2009070" y="4158000"/>
+            <a:ext cx="2596565" cy="2700000"/>
+          </a:xfrm>
+          <a:prstGeom prst="rect">
+            <a:avLst/>
+          </a:prstGeom>
+        </p:spPr>
+      </p:pic>
+      <p:pic>
+        <p:nvPicPr>
+          <p:cNvPr id="12" name="Picture 11">
+            <a:extLst>
+              <a:ext uri="{FF2B5EF4-FFF2-40B4-BE49-F238E27FC236}">
+                <a16:creationId xmlns:a16="http://schemas.microsoft.com/office/drawing/2014/main" id="{94415523-8524-0649-A20E-077504EEDF5A}"/>
+              </a:ext>
+            </a:extLst>
+          </p:cNvPr>
+          <p:cNvPicPr>
+            <a:picLocks noChangeAspect="1"/>
+          </p:cNvPicPr>
+          <p:nvPr/>
+        </p:nvPicPr>
+        <p:blipFill>
+          <a:blip r:embed="rId3"/>
+          <a:stretch>
+            <a:fillRect/>
+          </a:stretch>
+        </p:blipFill>
+        <p:spPr>
+          <a:xfrm>
+            <a:off x="5848470" y="4127229"/>
+            <a:ext cx="2596565" cy="2700000"/>
+          </a:xfrm>
+          <a:prstGeom prst="rect">
+            <a:avLst/>
+          </a:prstGeom>
+        </p:spPr>
+      </p:pic>
+      <p:pic>
+        <p:nvPicPr>
           <p:cNvPr id="5" name="Picture 4">
             <a:extLst>
               <a:ext uri="{FF2B5EF4-FFF2-40B4-BE49-F238E27FC236}">
@@ -2986,7 +3046,7 @@
           <p:nvPr/>
         </p:nvPicPr>
         <p:blipFill>
-          <a:blip r:embed="rId2"/>
+          <a:blip r:embed="rId4"/>
           <a:stretch>
             <a:fillRect/>
           </a:stretch>
@@ -3016,7 +3076,7 @@
           <p:nvPr/>
         </p:nvPicPr>
         <p:blipFill>
-          <a:blip r:embed="rId3"/>
+          <a:blip r:embed="rId5"/>
           <a:stretch>
             <a:fillRect/>
           </a:stretch>
@@ -3067,66 +3127,6 @@
           </a:p>
         </p:txBody>
       </p:sp>
-      <p:pic>
-        <p:nvPicPr>
-          <p:cNvPr id="17" name="Picture 16">
-            <a:extLst>
-              <a:ext uri="{FF2B5EF4-FFF2-40B4-BE49-F238E27FC236}">
-                <a16:creationId xmlns:a16="http://schemas.microsoft.com/office/drawing/2014/main" id="{91DB6844-0A14-6146-AA10-C7BA5994F44A}"/>
-              </a:ext>
-            </a:extLst>
-          </p:cNvPr>
-          <p:cNvPicPr>
-            <a:picLocks noChangeAspect="1"/>
-          </p:cNvPicPr>
-          <p:nvPr/>
-        </p:nvPicPr>
-        <p:blipFill>
-          <a:blip r:embed="rId4"/>
-          <a:stretch>
-            <a:fillRect/>
-          </a:stretch>
-        </p:blipFill>
-        <p:spPr>
-          <a:xfrm>
-            <a:off x="2060408" y="4132255"/>
-            <a:ext cx="2596566" cy="2700000"/>
-          </a:xfrm>
-          <a:prstGeom prst="rect">
-            <a:avLst/>
-          </a:prstGeom>
-        </p:spPr>
-      </p:pic>
-      <p:pic>
-        <p:nvPicPr>
-          <p:cNvPr id="15" name="Picture 14">
-            <a:extLst>
-              <a:ext uri="{FF2B5EF4-FFF2-40B4-BE49-F238E27FC236}">
-                <a16:creationId xmlns:a16="http://schemas.microsoft.com/office/drawing/2014/main" id="{EBCC678C-73F9-3840-A7E3-D6C977E999D7}"/>
-              </a:ext>
-            </a:extLst>
-          </p:cNvPr>
-          <p:cNvPicPr>
-            <a:picLocks noChangeAspect="1"/>
-          </p:cNvPicPr>
-          <p:nvPr/>
-        </p:nvPicPr>
-        <p:blipFill>
-          <a:blip r:embed="rId5"/>
-          <a:stretch>
-            <a:fillRect/>
-          </a:stretch>
-        </p:blipFill>
-        <p:spPr>
-          <a:xfrm>
-            <a:off x="5866514" y="4132255"/>
-            <a:ext cx="2596566" cy="2700000"/>
-          </a:xfrm>
-          <a:prstGeom prst="rect">
-            <a:avLst/>
-          </a:prstGeom>
-        </p:spPr>
-      </p:pic>
       <p:sp>
         <p:nvSpPr>
           <p:cNvPr id="19" name="TextBox 18">

</xml_diff>

<commit_message>
more progress coreg low delta model
</commit_message>
<xml_diff>
--- a/figure-assembly/figure-1.pptx
+++ b/figure-assembly/figure-1.pptx
@@ -244,7 +244,7 @@
           <a:p>
             <a:fld id="{25EC0CD3-564D-9742-98B5-86271438CCE6}" type="datetimeFigureOut">
               <a:rPr lang="en-US" smtClean="0"/>
-              <a:t>3/1/19</a:t>
+              <a:t>2019-09-03</a:t>
             </a:fld>
             <a:endParaRPr lang="en-US"/>
           </a:p>
@@ -286,7 +286,7 @@
           <a:p>
             <a:fld id="{A2D12DD3-8FC7-294C-8E74-A90D62DDF8C3}" type="slidenum">
               <a:rPr lang="en-US" smtClean="0"/>
-              <a:t>‹#›</a:t>
+              <a:t>‹N°›</a:t>
             </a:fld>
             <a:endParaRPr lang="en-US"/>
           </a:p>
@@ -414,7 +414,7 @@
           <a:p>
             <a:fld id="{25EC0CD3-564D-9742-98B5-86271438CCE6}" type="datetimeFigureOut">
               <a:rPr lang="en-US" smtClean="0"/>
-              <a:t>3/1/19</a:t>
+              <a:t>2019-09-03</a:t>
             </a:fld>
             <a:endParaRPr lang="en-US"/>
           </a:p>
@@ -456,7 +456,7 @@
           <a:p>
             <a:fld id="{A2D12DD3-8FC7-294C-8E74-A90D62DDF8C3}" type="slidenum">
               <a:rPr lang="en-US" smtClean="0"/>
-              <a:t>‹#›</a:t>
+              <a:t>‹N°›</a:t>
             </a:fld>
             <a:endParaRPr lang="en-US"/>
           </a:p>
@@ -594,7 +594,7 @@
           <a:p>
             <a:fld id="{25EC0CD3-564D-9742-98B5-86271438CCE6}" type="datetimeFigureOut">
               <a:rPr lang="en-US" smtClean="0"/>
-              <a:t>3/1/19</a:t>
+              <a:t>2019-09-03</a:t>
             </a:fld>
             <a:endParaRPr lang="en-US"/>
           </a:p>
@@ -636,7 +636,7 @@
           <a:p>
             <a:fld id="{A2D12DD3-8FC7-294C-8E74-A90D62DDF8C3}" type="slidenum">
               <a:rPr lang="en-US" smtClean="0"/>
-              <a:t>‹#›</a:t>
+              <a:t>‹N°›</a:t>
             </a:fld>
             <a:endParaRPr lang="en-US"/>
           </a:p>
@@ -764,7 +764,7 @@
           <a:p>
             <a:fld id="{25EC0CD3-564D-9742-98B5-86271438CCE6}" type="datetimeFigureOut">
               <a:rPr lang="en-US" smtClean="0"/>
-              <a:t>3/1/19</a:t>
+              <a:t>2019-09-03</a:t>
             </a:fld>
             <a:endParaRPr lang="en-US"/>
           </a:p>
@@ -806,7 +806,7 @@
           <a:p>
             <a:fld id="{A2D12DD3-8FC7-294C-8E74-A90D62DDF8C3}" type="slidenum">
               <a:rPr lang="en-US" smtClean="0"/>
-              <a:t>‹#›</a:t>
+              <a:t>‹N°›</a:t>
             </a:fld>
             <a:endParaRPr lang="en-US"/>
           </a:p>
@@ -1008,7 +1008,7 @@
           <a:p>
             <a:fld id="{25EC0CD3-564D-9742-98B5-86271438CCE6}" type="datetimeFigureOut">
               <a:rPr lang="en-US" smtClean="0"/>
-              <a:t>3/1/19</a:t>
+              <a:t>2019-09-03</a:t>
             </a:fld>
             <a:endParaRPr lang="en-US"/>
           </a:p>
@@ -1050,7 +1050,7 @@
           <a:p>
             <a:fld id="{A2D12DD3-8FC7-294C-8E74-A90D62DDF8C3}" type="slidenum">
               <a:rPr lang="en-US" smtClean="0"/>
-              <a:t>‹#›</a:t>
+              <a:t>‹N°›</a:t>
             </a:fld>
             <a:endParaRPr lang="en-US"/>
           </a:p>
@@ -1240,7 +1240,7 @@
           <a:p>
             <a:fld id="{25EC0CD3-564D-9742-98B5-86271438CCE6}" type="datetimeFigureOut">
               <a:rPr lang="en-US" smtClean="0"/>
-              <a:t>3/1/19</a:t>
+              <a:t>2019-09-03</a:t>
             </a:fld>
             <a:endParaRPr lang="en-US"/>
           </a:p>
@@ -1282,7 +1282,7 @@
           <a:p>
             <a:fld id="{A2D12DD3-8FC7-294C-8E74-A90D62DDF8C3}" type="slidenum">
               <a:rPr lang="en-US" smtClean="0"/>
-              <a:t>‹#›</a:t>
+              <a:t>‹N°›</a:t>
             </a:fld>
             <a:endParaRPr lang="en-US"/>
           </a:p>
@@ -1607,7 +1607,7 @@
           <a:p>
             <a:fld id="{25EC0CD3-564D-9742-98B5-86271438CCE6}" type="datetimeFigureOut">
               <a:rPr lang="en-US" smtClean="0"/>
-              <a:t>3/1/19</a:t>
+              <a:t>2019-09-03</a:t>
             </a:fld>
             <a:endParaRPr lang="en-US"/>
           </a:p>
@@ -1649,7 +1649,7 @@
           <a:p>
             <a:fld id="{A2D12DD3-8FC7-294C-8E74-A90D62DDF8C3}" type="slidenum">
               <a:rPr lang="en-US" smtClean="0"/>
-              <a:t>‹#›</a:t>
+              <a:t>‹N°›</a:t>
             </a:fld>
             <a:endParaRPr lang="en-US"/>
           </a:p>
@@ -1725,7 +1725,7 @@
           <a:p>
             <a:fld id="{25EC0CD3-564D-9742-98B5-86271438CCE6}" type="datetimeFigureOut">
               <a:rPr lang="en-US" smtClean="0"/>
-              <a:t>3/1/19</a:t>
+              <a:t>2019-09-03</a:t>
             </a:fld>
             <a:endParaRPr lang="en-US"/>
           </a:p>
@@ -1767,7 +1767,7 @@
           <a:p>
             <a:fld id="{A2D12DD3-8FC7-294C-8E74-A90D62DDF8C3}" type="slidenum">
               <a:rPr lang="en-US" smtClean="0"/>
-              <a:t>‹#›</a:t>
+              <a:t>‹N°›</a:t>
             </a:fld>
             <a:endParaRPr lang="en-US"/>
           </a:p>
@@ -1820,7 +1820,7 @@
           <a:p>
             <a:fld id="{25EC0CD3-564D-9742-98B5-86271438CCE6}" type="datetimeFigureOut">
               <a:rPr lang="en-US" smtClean="0"/>
-              <a:t>3/1/19</a:t>
+              <a:t>2019-09-03</a:t>
             </a:fld>
             <a:endParaRPr lang="en-US"/>
           </a:p>
@@ -1862,7 +1862,7 @@
           <a:p>
             <a:fld id="{A2D12DD3-8FC7-294C-8E74-A90D62DDF8C3}" type="slidenum">
               <a:rPr lang="en-US" smtClean="0"/>
-              <a:t>‹#›</a:t>
+              <a:t>‹N°›</a:t>
             </a:fld>
             <a:endParaRPr lang="en-US"/>
           </a:p>
@@ -2097,7 +2097,7 @@
           <a:p>
             <a:fld id="{25EC0CD3-564D-9742-98B5-86271438CCE6}" type="datetimeFigureOut">
               <a:rPr lang="en-US" smtClean="0"/>
-              <a:t>3/1/19</a:t>
+              <a:t>2019-09-03</a:t>
             </a:fld>
             <a:endParaRPr lang="en-US"/>
           </a:p>
@@ -2139,7 +2139,7 @@
           <a:p>
             <a:fld id="{A2D12DD3-8FC7-294C-8E74-A90D62DDF8C3}" type="slidenum">
               <a:rPr lang="en-US" smtClean="0"/>
-              <a:t>‹#›</a:t>
+              <a:t>‹N°›</a:t>
             </a:fld>
             <a:endParaRPr lang="en-US"/>
           </a:p>
@@ -2354,7 +2354,7 @@
           <a:p>
             <a:fld id="{25EC0CD3-564D-9742-98B5-86271438CCE6}" type="datetimeFigureOut">
               <a:rPr lang="en-US" smtClean="0"/>
-              <a:t>3/1/19</a:t>
+              <a:t>2019-09-03</a:t>
             </a:fld>
             <a:endParaRPr lang="en-US"/>
           </a:p>
@@ -2396,7 +2396,7 @@
           <a:p>
             <a:fld id="{A2D12DD3-8FC7-294C-8E74-A90D62DDF8C3}" type="slidenum">
               <a:rPr lang="en-US" smtClean="0"/>
-              <a:t>‹#›</a:t>
+              <a:t>‹N°›</a:t>
             </a:fld>
             <a:endParaRPr lang="en-US"/>
           </a:p>
@@ -2567,7 +2567,7 @@
           <a:p>
             <a:fld id="{25EC0CD3-564D-9742-98B5-86271438CCE6}" type="datetimeFigureOut">
               <a:rPr lang="en-US" smtClean="0"/>
-              <a:t>3/1/19</a:t>
+              <a:t>2019-09-03</a:t>
             </a:fld>
             <a:endParaRPr lang="en-US"/>
           </a:p>
@@ -2645,7 +2645,7 @@
           <a:p>
             <a:fld id="{A2D12DD3-8FC7-294C-8E74-A90D62DDF8C3}" type="slidenum">
               <a:rPr lang="en-US" smtClean="0"/>
-              <a:t>‹#›</a:t>
+              <a:t>‹N°›</a:t>
             </a:fld>
             <a:endParaRPr lang="en-US"/>
           </a:p>
@@ -3678,10 +3678,10 @@
       </p:grpSpPr>
       <p:pic>
         <p:nvPicPr>
-          <p:cNvPr id="18" name="Picture 17">
+          <p:cNvPr id="4" name="Picture 3">
             <a:extLst>
               <a:ext uri="{FF2B5EF4-FFF2-40B4-BE49-F238E27FC236}">
-                <a16:creationId xmlns:a16="http://schemas.microsoft.com/office/drawing/2014/main" id="{050D7499-21DE-764E-8D88-D7A51A879F8A}"/>
+                <a16:creationId xmlns:a16="http://schemas.microsoft.com/office/drawing/2014/main" id="{C76894B8-4BBD-9D43-8508-9FEB849F4B3D}"/>
               </a:ext>
             </a:extLst>
           </p:cNvPr>
@@ -3698,8 +3698,8 @@
         </p:blipFill>
         <p:spPr>
           <a:xfrm>
-            <a:off x="2009070" y="4158000"/>
-            <a:ext cx="2596565" cy="2700000"/>
+            <a:off x="29885" y="621434"/>
+            <a:ext cx="5968580" cy="3032294"/>
           </a:xfrm>
           <a:prstGeom prst="rect">
             <a:avLst/>
@@ -3708,10 +3708,100 @@
       </p:pic>
       <p:pic>
         <p:nvPicPr>
-          <p:cNvPr id="12" name="Picture 11">
+          <p:cNvPr id="23" name="Image 22"/>
+          <p:cNvPicPr>
+            <a:picLocks noChangeAspect="1"/>
+          </p:cNvPicPr>
+          <p:nvPr/>
+        </p:nvPicPr>
+        <p:blipFill>
+          <a:blip r:embed="rId3">
+            <a:extLst>
+              <a:ext uri="{28A0092B-C50C-407E-A947-70E740481C1C}">
+                <a14:useLocalDpi xmlns:a14="http://schemas.microsoft.com/office/drawing/2010/main" val="0"/>
+              </a:ext>
+            </a:extLst>
+          </a:blip>
+          <a:stretch>
+            <a:fillRect/>
+          </a:stretch>
+        </p:blipFill>
+        <p:spPr>
+          <a:xfrm>
+            <a:off x="5159207" y="3904308"/>
+            <a:ext cx="2322078" cy="2415477"/>
+          </a:xfrm>
+          <a:prstGeom prst="rect">
+            <a:avLst/>
+          </a:prstGeom>
+        </p:spPr>
+      </p:pic>
+      <p:pic>
+        <p:nvPicPr>
+          <p:cNvPr id="9" name="Image 8"/>
+          <p:cNvPicPr>
+            <a:picLocks noChangeAspect="1"/>
+          </p:cNvPicPr>
+          <p:nvPr/>
+        </p:nvPicPr>
+        <p:blipFill>
+          <a:blip r:embed="rId4">
+            <a:extLst>
+              <a:ext uri="{28A0092B-C50C-407E-A947-70E740481C1C}">
+                <a14:useLocalDpi xmlns:a14="http://schemas.microsoft.com/office/drawing/2010/main" val="0"/>
+              </a:ext>
+            </a:extLst>
+          </a:blip>
+          <a:stretch>
+            <a:fillRect/>
+          </a:stretch>
+        </p:blipFill>
+        <p:spPr>
+          <a:xfrm>
+            <a:off x="2706587" y="3871629"/>
+            <a:ext cx="2347497" cy="2441918"/>
+          </a:xfrm>
+          <a:prstGeom prst="rect">
+            <a:avLst/>
+          </a:prstGeom>
+        </p:spPr>
+      </p:pic>
+      <p:pic>
+        <p:nvPicPr>
+          <p:cNvPr id="2" name="Image 1"/>
+          <p:cNvPicPr>
+            <a:picLocks noChangeAspect="1"/>
+          </p:cNvPicPr>
+          <p:nvPr/>
+        </p:nvPicPr>
+        <p:blipFill>
+          <a:blip r:embed="rId5">
+            <a:extLst>
+              <a:ext uri="{28A0092B-C50C-407E-A947-70E740481C1C}">
+                <a14:useLocalDpi xmlns:a14="http://schemas.microsoft.com/office/drawing/2010/main" val="0"/>
+              </a:ext>
+            </a:extLst>
+          </a:blip>
+          <a:stretch>
+            <a:fillRect/>
+          </a:stretch>
+        </p:blipFill>
+        <p:spPr>
+          <a:xfrm>
+            <a:off x="229858" y="3839264"/>
+            <a:ext cx="2409726" cy="2506649"/>
+          </a:xfrm>
+          <a:prstGeom prst="rect">
+            <a:avLst/>
+          </a:prstGeom>
+        </p:spPr>
+      </p:pic>
+      <p:pic>
+        <p:nvPicPr>
+          <p:cNvPr id="7" name="Picture 6">
             <a:extLst>
               <a:ext uri="{FF2B5EF4-FFF2-40B4-BE49-F238E27FC236}">
-                <a16:creationId xmlns:a16="http://schemas.microsoft.com/office/drawing/2014/main" id="{94415523-8524-0649-A20E-077504EEDF5A}"/>
+                <a16:creationId xmlns:a16="http://schemas.microsoft.com/office/drawing/2014/main" id="{E17FDF5D-5577-FB47-9112-5097485AEE20}"/>
               </a:ext>
             </a:extLst>
           </p:cNvPr>
@@ -3721,75 +3811,15 @@
           <p:nvPr/>
         </p:nvPicPr>
         <p:blipFill>
-          <a:blip r:embed="rId3"/>
+          <a:blip r:embed="rId6"/>
           <a:stretch>
             <a:fillRect/>
           </a:stretch>
         </p:blipFill>
         <p:spPr>
           <a:xfrm>
-            <a:off x="5848470" y="4127229"/>
-            <a:ext cx="2596565" cy="2700000"/>
-          </a:xfrm>
-          <a:prstGeom prst="rect">
-            <a:avLst/>
-          </a:prstGeom>
-        </p:spPr>
-      </p:pic>
-      <p:pic>
-        <p:nvPicPr>
-          <p:cNvPr id="5" name="Picture 4">
-            <a:extLst>
-              <a:ext uri="{FF2B5EF4-FFF2-40B4-BE49-F238E27FC236}">
-                <a16:creationId xmlns:a16="http://schemas.microsoft.com/office/drawing/2014/main" id="{1D4AA84E-614B-0F42-8352-7C8EE14689E4}"/>
-              </a:ext>
-            </a:extLst>
-          </p:cNvPr>
-          <p:cNvPicPr>
-            <a:picLocks noChangeAspect="1"/>
-          </p:cNvPicPr>
-          <p:nvPr/>
-        </p:nvPicPr>
-        <p:blipFill>
-          <a:blip r:embed="rId4"/>
-          <a:stretch>
-            <a:fillRect/>
-          </a:stretch>
-        </p:blipFill>
-        <p:spPr>
-          <a:xfrm>
-            <a:off x="302885" y="498958"/>
-            <a:ext cx="5402348" cy="3240000"/>
-          </a:xfrm>
-          <a:prstGeom prst="rect">
-            <a:avLst/>
-          </a:prstGeom>
-        </p:spPr>
-      </p:pic>
-      <p:pic>
-        <p:nvPicPr>
-          <p:cNvPr id="8" name="Picture 7">
-            <a:extLst>
-              <a:ext uri="{FF2B5EF4-FFF2-40B4-BE49-F238E27FC236}">
-                <a16:creationId xmlns:a16="http://schemas.microsoft.com/office/drawing/2014/main" id="{DC85F987-E983-BB47-9611-A5328A004DB4}"/>
-              </a:ext>
-            </a:extLst>
-          </p:cNvPr>
-          <p:cNvPicPr>
-            <a:picLocks noChangeAspect="1"/>
-          </p:cNvPicPr>
-          <p:nvPr/>
-        </p:nvPicPr>
-        <p:blipFill>
-          <a:blip r:embed="rId5"/>
-          <a:stretch>
-            <a:fillRect/>
-          </a:stretch>
-        </p:blipFill>
-        <p:spPr>
-          <a:xfrm>
-            <a:off x="6056961" y="694508"/>
-            <a:ext cx="3780000" cy="1788750"/>
+            <a:off x="6250637" y="844143"/>
+            <a:ext cx="3740707" cy="1770156"/>
           </a:xfrm>
           <a:prstGeom prst="rect">
             <a:avLst/>
@@ -3810,7 +3840,7 @@
         </p:nvSpPr>
         <p:spPr>
           <a:xfrm>
-            <a:off x="271628" y="279709"/>
+            <a:off x="106254" y="173491"/>
             <a:ext cx="653849" cy="447943"/>
           </a:xfrm>
           <a:prstGeom prst="rect">
@@ -3846,7 +3876,7 @@
         </p:nvSpPr>
         <p:spPr>
           <a:xfrm>
-            <a:off x="5359043" y="3684312"/>
+            <a:off x="2438529" y="3450126"/>
             <a:ext cx="653849" cy="447943"/>
           </a:xfrm>
           <a:prstGeom prst="rect">
@@ -3882,7 +3912,7 @@
         </p:nvSpPr>
         <p:spPr>
           <a:xfrm>
-            <a:off x="1507808" y="3684312"/>
+            <a:off x="143227" y="3439561"/>
             <a:ext cx="653849" cy="447943"/>
           </a:xfrm>
           <a:prstGeom prst="rect">
@@ -3900,78 +3930,6 @@
             <a:r>
               <a:rPr lang="en-US" sz="2311" dirty="0"/>
               <a:t>C</a:t>
-            </a:r>
-          </a:p>
-        </p:txBody>
-      </p:sp>
-      <p:sp>
-        <p:nvSpPr>
-          <p:cNvPr id="11" name="TextBox 10">
-            <a:extLst>
-              <a:ext uri="{FF2B5EF4-FFF2-40B4-BE49-F238E27FC236}">
-                <a16:creationId xmlns:a16="http://schemas.microsoft.com/office/drawing/2014/main" id="{21C26C2C-A6D4-CC40-9147-2E88070074D5}"/>
-              </a:ext>
-            </a:extLst>
-          </p:cNvPr>
-          <p:cNvSpPr txBox="1"/>
-          <p:nvPr/>
-        </p:nvSpPr>
-        <p:spPr>
-          <a:xfrm>
-            <a:off x="2898218" y="3847238"/>
-            <a:ext cx="1197864" cy="338554"/>
-          </a:xfrm>
-          <a:prstGeom prst="rect">
-            <a:avLst/>
-          </a:prstGeom>
-          <a:noFill/>
-        </p:spPr>
-        <p:txBody>
-          <a:bodyPr wrap="square" rtlCol="0">
-            <a:spAutoFit/>
-          </a:bodyPr>
-          <a:lstStyle/>
-          <a:p>
-            <a:pPr algn="ctr"/>
-            <a:r>
-              <a:rPr lang="en-US" sz="1600" dirty="0"/>
-              <a:t>Fitted</a:t>
-            </a:r>
-          </a:p>
-        </p:txBody>
-      </p:sp>
-      <p:sp>
-        <p:nvSpPr>
-          <p:cNvPr id="14" name="TextBox 13">
-            <a:extLst>
-              <a:ext uri="{FF2B5EF4-FFF2-40B4-BE49-F238E27FC236}">
-                <a16:creationId xmlns:a16="http://schemas.microsoft.com/office/drawing/2014/main" id="{DD45CC1B-B5E0-D947-8CAE-305A0328A523}"/>
-              </a:ext>
-            </a:extLst>
-          </p:cNvPr>
-          <p:cNvSpPr txBox="1"/>
-          <p:nvPr/>
-        </p:nvSpPr>
-        <p:spPr>
-          <a:xfrm>
-            <a:off x="6692598" y="3828232"/>
-            <a:ext cx="1197864" cy="338554"/>
-          </a:xfrm>
-          <a:prstGeom prst="rect">
-            <a:avLst/>
-          </a:prstGeom>
-          <a:noFill/>
-        </p:spPr>
-        <p:txBody>
-          <a:bodyPr wrap="square" rtlCol="0">
-            <a:spAutoFit/>
-          </a:bodyPr>
-          <a:lstStyle/>
-          <a:p>
-            <a:pPr algn="ctr"/>
-            <a:r>
-              <a:rPr lang="en-US" sz="1600" dirty="0"/>
-              <a:t>Predicted</a:t>
             </a:r>
           </a:p>
         </p:txBody>
@@ -3990,7 +3948,7 @@
         </p:nvSpPr>
         <p:spPr>
           <a:xfrm rot="19703640">
-            <a:off x="2782817" y="5700355"/>
+            <a:off x="909408" y="5355608"/>
             <a:ext cx="1721922" cy="246221"/>
           </a:xfrm>
           <a:prstGeom prst="rect">
@@ -4006,7 +3964,10 @@
           <a:p>
             <a:pPr algn="ctr"/>
             <a:r>
-              <a:rPr lang="en-US" sz="1000" dirty="0"/>
+              <a:rPr lang="en-US" sz="1000" dirty="0">
+                <a:latin typeface="Arial" panose="020B0604020202020204" pitchFamily="34" charset="0"/>
+                <a:cs typeface="Arial" panose="020B0604020202020204" pitchFamily="34" charset="0"/>
+              </a:rPr>
               <a:t>nutrient quality</a:t>
             </a:r>
           </a:p>
@@ -4025,8 +3986,8 @@
           <p:nvPr/>
         </p:nvSpPr>
         <p:spPr>
-          <a:xfrm rot="1438059">
-            <a:off x="2554547" y="4444833"/>
+          <a:xfrm rot="1167601">
+            <a:off x="853664" y="4143213"/>
             <a:ext cx="1925781" cy="246221"/>
           </a:xfrm>
           <a:prstGeom prst="rect">
@@ -4042,7 +4003,10 @@
           <a:p>
             <a:pPr algn="ctr"/>
             <a:r>
-              <a:rPr lang="en-US" sz="1000" dirty="0"/>
+              <a:rPr lang="en-US" sz="1000" dirty="0">
+                <a:latin typeface="Arial" panose="020B0604020202020204" pitchFamily="34" charset="0"/>
+                <a:cs typeface="Arial" panose="020B0604020202020204" pitchFamily="34" charset="0"/>
+              </a:rPr>
               <a:t>chloramphenicol</a:t>
             </a:r>
           </a:p>
@@ -4061,8 +4025,8 @@
           <p:nvPr/>
         </p:nvSpPr>
         <p:spPr>
-          <a:xfrm rot="3055022">
-            <a:off x="6533791" y="4835894"/>
+          <a:xfrm rot="2525420">
+            <a:off x="3252034" y="4788764"/>
             <a:ext cx="1858123" cy="246221"/>
           </a:xfrm>
           <a:prstGeom prst="rect">
@@ -4078,7 +4042,10 @@
           <a:p>
             <a:pPr algn="ctr"/>
             <a:r>
-              <a:rPr lang="en-US" sz="1000" dirty="0"/>
+              <a:rPr lang="en-US" sz="1000" dirty="0">
+                <a:latin typeface="Arial" panose="020B0604020202020204" pitchFamily="34" charset="0"/>
+                <a:cs typeface="Arial" panose="020B0604020202020204" pitchFamily="34" charset="0"/>
+              </a:rPr>
               <a:t>useless expression strength</a:t>
             </a:r>
           </a:p>
@@ -4100,7 +4067,7 @@
         </p:nvCxnSpPr>
         <p:spPr>
           <a:xfrm flipV="1">
-            <a:off x="2919719" y="5293957"/>
+            <a:off x="1046310" y="4949210"/>
             <a:ext cx="1320353" cy="785185"/>
           </a:xfrm>
           <a:prstGeom prst="straightConnector1">
@@ -4143,9 +4110,9 @@
           <p:nvPr/>
         </p:nvCxnSpPr>
         <p:spPr>
-          <a:xfrm rot="21391427" flipH="1" flipV="1">
-            <a:off x="2646964" y="4251021"/>
-            <a:ext cx="1581397" cy="852073"/>
+          <a:xfrm flipH="1" flipV="1">
+            <a:off x="946286" y="4154181"/>
+            <a:ext cx="1420377" cy="468097"/>
           </a:xfrm>
           <a:prstGeom prst="straightConnector1">
             <a:avLst/>
@@ -4188,8 +4155,8 @@
         </p:nvCxnSpPr>
         <p:spPr>
           <a:xfrm flipH="1" flipV="1">
-            <a:off x="6781568" y="4619715"/>
-            <a:ext cx="938383" cy="1149864"/>
+            <a:off x="3552822" y="4595822"/>
+            <a:ext cx="992422" cy="874410"/>
           </a:xfrm>
           <a:prstGeom prst="straightConnector1">
             <a:avLst/>
@@ -4230,8 +4197,8 @@
         </p:nvSpPr>
         <p:spPr>
           <a:xfrm>
-            <a:off x="7647377" y="5805297"/>
-            <a:ext cx="931826" cy="400110"/>
+            <a:off x="3423948" y="5488174"/>
+            <a:ext cx="1197499" cy="246221"/>
           </a:xfrm>
           <a:prstGeom prst="rect">
             <a:avLst/>
@@ -4246,7 +4213,10 @@
           <a:p>
             <a:pPr algn="ctr"/>
             <a:r>
-              <a:rPr lang="en-US" sz="1000" dirty="0"/>
+              <a:rPr lang="en-US" sz="1000" dirty="0">
+                <a:latin typeface="Arial" panose="020B0604020202020204" pitchFamily="34" charset="0"/>
+                <a:cs typeface="Arial" panose="020B0604020202020204" pitchFamily="34" charset="0"/>
+              </a:rPr>
               <a:t>nutrient quality</a:t>
             </a:r>
           </a:p>
@@ -4268,8 +4238,8 @@
         </p:nvCxnSpPr>
         <p:spPr>
           <a:xfrm>
-            <a:off x="6646128" y="6038260"/>
-            <a:ext cx="1209262" cy="0"/>
+            <a:off x="3217434" y="5715779"/>
+            <a:ext cx="1678416" cy="0"/>
           </a:xfrm>
           <a:prstGeom prst="straightConnector1">
             <a:avLst/>
@@ -4310,7 +4280,7 @@
         </p:nvSpPr>
         <p:spPr>
           <a:xfrm>
-            <a:off x="5907296" y="279709"/>
+            <a:off x="6106679" y="173491"/>
             <a:ext cx="653849" cy="447943"/>
           </a:xfrm>
           <a:prstGeom prst="rect">
@@ -4332,10 +4302,446 @@
           </a:p>
         </p:txBody>
       </p:sp>
+      <p:sp>
+        <p:nvSpPr>
+          <p:cNvPr id="36" name="TextBox 18">
+            <a:extLst>
+              <a:ext uri="{FF2B5EF4-FFF2-40B4-BE49-F238E27FC236}">
+                <a16:creationId xmlns:a16="http://schemas.microsoft.com/office/drawing/2014/main" id="{911ECD02-6A9D-A34F-AB9A-0AEE7695EF60}"/>
+              </a:ext>
+            </a:extLst>
+          </p:cNvPr>
+          <p:cNvSpPr txBox="1"/>
+          <p:nvPr/>
+        </p:nvSpPr>
+        <p:spPr>
+          <a:xfrm>
+            <a:off x="7312993" y="3465328"/>
+            <a:ext cx="653849" cy="447943"/>
+          </a:xfrm>
+          <a:prstGeom prst="rect">
+            <a:avLst/>
+          </a:prstGeom>
+          <a:noFill/>
+        </p:spPr>
+        <p:txBody>
+          <a:bodyPr wrap="square" rtlCol="0">
+            <a:spAutoFit/>
+          </a:bodyPr>
+          <a:lstStyle/>
+          <a:p>
+            <a:pPr algn="ctr"/>
+            <a:r>
+              <a:rPr lang="en-US" sz="2311" dirty="0" smtClean="0"/>
+              <a:t>F</a:t>
+            </a:r>
+            <a:endParaRPr lang="en-US" sz="2311" dirty="0"/>
+          </a:p>
+        </p:txBody>
+      </p:sp>
+      <p:sp>
+        <p:nvSpPr>
+          <p:cNvPr id="37" name="TextBox 5">
+            <a:extLst>
+              <a:ext uri="{FF2B5EF4-FFF2-40B4-BE49-F238E27FC236}">
+                <a16:creationId xmlns:a16="http://schemas.microsoft.com/office/drawing/2014/main" id="{BCC2B194-BC2D-3245-9250-59A2BA620129}"/>
+              </a:ext>
+            </a:extLst>
+          </p:cNvPr>
+          <p:cNvSpPr txBox="1"/>
+          <p:nvPr/>
+        </p:nvSpPr>
+        <p:spPr>
+          <a:xfrm>
+            <a:off x="4887871" y="3439561"/>
+            <a:ext cx="653849" cy="447943"/>
+          </a:xfrm>
+          <a:prstGeom prst="rect">
+            <a:avLst/>
+          </a:prstGeom>
+          <a:noFill/>
+        </p:spPr>
+        <p:txBody>
+          <a:bodyPr wrap="square" rtlCol="0">
+            <a:spAutoFit/>
+          </a:bodyPr>
+          <a:lstStyle/>
+          <a:p>
+            <a:pPr algn="ctr"/>
+            <a:r>
+              <a:rPr lang="en-US" sz="2311" dirty="0" smtClean="0"/>
+              <a:t>E</a:t>
+            </a:r>
+            <a:endParaRPr lang="en-US" sz="2311" dirty="0"/>
+          </a:p>
+        </p:txBody>
+      </p:sp>
+      <p:pic>
+        <p:nvPicPr>
+          <p:cNvPr id="25" name="Image 24"/>
+          <p:cNvPicPr>
+            <a:picLocks noChangeAspect="1"/>
+          </p:cNvPicPr>
+          <p:nvPr/>
+        </p:nvPicPr>
+        <p:blipFill>
+          <a:blip r:embed="rId7">
+            <a:extLst>
+              <a:ext uri="{28A0092B-C50C-407E-A947-70E740481C1C}">
+                <a14:useLocalDpi xmlns:a14="http://schemas.microsoft.com/office/drawing/2010/main" val="0"/>
+              </a:ext>
+            </a:extLst>
+          </a:blip>
+          <a:stretch>
+            <a:fillRect/>
+          </a:stretch>
+        </p:blipFill>
+        <p:spPr>
+          <a:xfrm>
+            <a:off x="7573707" y="3913271"/>
+            <a:ext cx="2322080" cy="2415478"/>
+          </a:xfrm>
+          <a:prstGeom prst="rect">
+            <a:avLst/>
+          </a:prstGeom>
+        </p:spPr>
+      </p:pic>
+      <p:sp>
+        <p:nvSpPr>
+          <p:cNvPr id="38" name="TextBox 33">
+            <a:extLst>
+              <a:ext uri="{FF2B5EF4-FFF2-40B4-BE49-F238E27FC236}">
+                <a16:creationId xmlns:a16="http://schemas.microsoft.com/office/drawing/2014/main" id="{70E62564-86B6-D142-8D3B-EDC18001055B}"/>
+              </a:ext>
+            </a:extLst>
+          </p:cNvPr>
+          <p:cNvSpPr txBox="1"/>
+          <p:nvPr/>
+        </p:nvSpPr>
+        <p:spPr>
+          <a:xfrm rot="20422514">
+            <a:off x="5839396" y="4826099"/>
+            <a:ext cx="1197499" cy="246221"/>
+          </a:xfrm>
+          <a:prstGeom prst="rect">
+            <a:avLst/>
+          </a:prstGeom>
+          <a:noFill/>
+        </p:spPr>
+        <p:txBody>
+          <a:bodyPr wrap="square" rtlCol="0">
+            <a:spAutoFit/>
+          </a:bodyPr>
+          <a:lstStyle/>
+          <a:p>
+            <a:pPr algn="ctr"/>
+            <a:r>
+              <a:rPr lang="en-US" sz="1000" dirty="0">
+                <a:latin typeface="Arial" panose="020B0604020202020204" pitchFamily="34" charset="0"/>
+                <a:cs typeface="Arial" panose="020B0604020202020204" pitchFamily="34" charset="0"/>
+              </a:rPr>
+              <a:t>nutrient quality</a:t>
+            </a:r>
+          </a:p>
+        </p:txBody>
+      </p:sp>
+      <p:cxnSp>
+        <p:nvCxnSpPr>
+          <p:cNvPr id="39" name="Straight Arrow Connector 34">
+            <a:extLst>
+              <a:ext uri="{FF2B5EF4-FFF2-40B4-BE49-F238E27FC236}">
+                <a16:creationId xmlns:a16="http://schemas.microsoft.com/office/drawing/2014/main" id="{AD32726E-A487-FC4C-BAD2-C2764855C8A2}"/>
+              </a:ext>
+            </a:extLst>
+          </p:cNvPr>
+          <p:cNvCxnSpPr>
+            <a:cxnSpLocks/>
+          </p:cNvCxnSpPr>
+          <p:nvPr/>
+        </p:nvCxnSpPr>
+        <p:spPr>
+          <a:xfrm flipV="1">
+            <a:off x="6058188" y="4881099"/>
+            <a:ext cx="936784" cy="377482"/>
+          </a:xfrm>
+          <a:prstGeom prst="straightConnector1">
+            <a:avLst/>
+          </a:prstGeom>
+          <a:ln>
+            <a:solidFill>
+              <a:schemeClr val="tx1"/>
+            </a:solidFill>
+            <a:tailEnd type="triangle"/>
+          </a:ln>
+        </p:spPr>
+        <p:style>
+          <a:lnRef idx="1">
+            <a:schemeClr val="accent1"/>
+          </a:lnRef>
+          <a:fillRef idx="0">
+            <a:schemeClr val="accent1"/>
+          </a:fillRef>
+          <a:effectRef idx="0">
+            <a:schemeClr val="accent1"/>
+          </a:effectRef>
+          <a:fontRef idx="minor">
+            <a:schemeClr val="tx1"/>
+          </a:fontRef>
+        </p:style>
+      </p:cxnSp>
+      <p:sp>
+        <p:nvSpPr>
+          <p:cNvPr id="44" name="TextBox 28">
+            <a:extLst>
+              <a:ext uri="{FF2B5EF4-FFF2-40B4-BE49-F238E27FC236}">
+                <a16:creationId xmlns:a16="http://schemas.microsoft.com/office/drawing/2014/main" id="{1F5B14A8-29C7-E340-ABFA-3954C20A3032}"/>
+              </a:ext>
+            </a:extLst>
+          </p:cNvPr>
+          <p:cNvSpPr txBox="1"/>
+          <p:nvPr/>
+        </p:nvSpPr>
+        <p:spPr>
+          <a:xfrm rot="468791">
+            <a:off x="5531290" y="4222817"/>
+            <a:ext cx="1925781" cy="246221"/>
+          </a:xfrm>
+          <a:prstGeom prst="rect">
+            <a:avLst/>
+          </a:prstGeom>
+          <a:noFill/>
+        </p:spPr>
+        <p:txBody>
+          <a:bodyPr wrap="square" rtlCol="0">
+            <a:spAutoFit/>
+          </a:bodyPr>
+          <a:lstStyle/>
+          <a:p>
+            <a:pPr algn="ctr"/>
+            <a:r>
+              <a:rPr lang="en-US" sz="1000" dirty="0">
+                <a:latin typeface="Arial" panose="020B0604020202020204" pitchFamily="34" charset="0"/>
+                <a:cs typeface="Arial" panose="020B0604020202020204" pitchFamily="34" charset="0"/>
+              </a:rPr>
+              <a:t>chloramphenicol</a:t>
+            </a:r>
+          </a:p>
+        </p:txBody>
+      </p:sp>
+      <p:cxnSp>
+        <p:nvCxnSpPr>
+          <p:cNvPr id="45" name="Straight Arrow Connector 31">
+            <a:extLst>
+              <a:ext uri="{FF2B5EF4-FFF2-40B4-BE49-F238E27FC236}">
+                <a16:creationId xmlns:a16="http://schemas.microsoft.com/office/drawing/2014/main" id="{9613CAC1-7195-684D-AF43-CF2F7E1CD73B}"/>
+              </a:ext>
+            </a:extLst>
+          </p:cNvPr>
+          <p:cNvCxnSpPr>
+            <a:cxnSpLocks/>
+          </p:cNvCxnSpPr>
+          <p:nvPr/>
+        </p:nvCxnSpPr>
+        <p:spPr>
+          <a:xfrm flipH="1" flipV="1">
+            <a:off x="5735782" y="4345928"/>
+            <a:ext cx="1376954" cy="209249"/>
+          </a:xfrm>
+          <a:prstGeom prst="straightConnector1">
+            <a:avLst/>
+          </a:prstGeom>
+          <a:ln>
+            <a:solidFill>
+              <a:schemeClr val="tx1"/>
+            </a:solidFill>
+            <a:tailEnd type="triangle"/>
+          </a:ln>
+        </p:spPr>
+        <p:style>
+          <a:lnRef idx="1">
+            <a:schemeClr val="accent1"/>
+          </a:lnRef>
+          <a:fillRef idx="0">
+            <a:schemeClr val="accent1"/>
+          </a:fillRef>
+          <a:effectRef idx="0">
+            <a:schemeClr val="accent1"/>
+          </a:effectRef>
+          <a:fontRef idx="minor">
+            <a:schemeClr val="tx1"/>
+          </a:fontRef>
+        </p:style>
+      </p:cxnSp>
+      <p:sp>
+        <p:nvSpPr>
+          <p:cNvPr id="51" name="TextBox 33">
+            <a:extLst>
+              <a:ext uri="{FF2B5EF4-FFF2-40B4-BE49-F238E27FC236}">
+                <a16:creationId xmlns:a16="http://schemas.microsoft.com/office/drawing/2014/main" id="{70E62564-86B6-D142-8D3B-EDC18001055B}"/>
+              </a:ext>
+            </a:extLst>
+          </p:cNvPr>
+          <p:cNvSpPr txBox="1"/>
+          <p:nvPr/>
+        </p:nvSpPr>
+        <p:spPr>
+          <a:xfrm>
+            <a:off x="8365357" y="4008200"/>
+            <a:ext cx="1197499" cy="246221"/>
+          </a:xfrm>
+          <a:prstGeom prst="rect">
+            <a:avLst/>
+          </a:prstGeom>
+          <a:noFill/>
+        </p:spPr>
+        <p:txBody>
+          <a:bodyPr wrap="square" rtlCol="0">
+            <a:spAutoFit/>
+          </a:bodyPr>
+          <a:lstStyle/>
+          <a:p>
+            <a:pPr algn="ctr"/>
+            <a:r>
+              <a:rPr lang="en-US" sz="1000" dirty="0">
+                <a:latin typeface="Arial" panose="020B0604020202020204" pitchFamily="34" charset="0"/>
+                <a:cs typeface="Arial" panose="020B0604020202020204" pitchFamily="34" charset="0"/>
+              </a:rPr>
+              <a:t>nutrient quality</a:t>
+            </a:r>
+          </a:p>
+        </p:txBody>
+      </p:sp>
+      <p:cxnSp>
+        <p:nvCxnSpPr>
+          <p:cNvPr id="52" name="Straight Arrow Connector 34">
+            <a:extLst>
+              <a:ext uri="{FF2B5EF4-FFF2-40B4-BE49-F238E27FC236}">
+                <a16:creationId xmlns:a16="http://schemas.microsoft.com/office/drawing/2014/main" id="{AD32726E-A487-FC4C-BAD2-C2764855C8A2}"/>
+              </a:ext>
+            </a:extLst>
+          </p:cNvPr>
+          <p:cNvCxnSpPr>
+            <a:cxnSpLocks/>
+          </p:cNvCxnSpPr>
+          <p:nvPr/>
+        </p:nvCxnSpPr>
+        <p:spPr>
+          <a:xfrm flipV="1">
+            <a:off x="8520258" y="4245331"/>
+            <a:ext cx="1009150" cy="2163"/>
+          </a:xfrm>
+          <a:prstGeom prst="straightConnector1">
+            <a:avLst/>
+          </a:prstGeom>
+          <a:ln>
+            <a:solidFill>
+              <a:schemeClr val="tx1"/>
+            </a:solidFill>
+            <a:tailEnd type="triangle"/>
+          </a:ln>
+        </p:spPr>
+        <p:style>
+          <a:lnRef idx="1">
+            <a:schemeClr val="accent1"/>
+          </a:lnRef>
+          <a:fillRef idx="0">
+            <a:schemeClr val="accent1"/>
+          </a:fillRef>
+          <a:effectRef idx="0">
+            <a:schemeClr val="accent1"/>
+          </a:effectRef>
+          <a:fontRef idx="minor">
+            <a:schemeClr val="tx1"/>
+          </a:fontRef>
+        </p:style>
+      </p:cxnSp>
+      <p:cxnSp>
+        <p:nvCxnSpPr>
+          <p:cNvPr id="55" name="Straight Arrow Connector 31">
+            <a:extLst>
+              <a:ext uri="{FF2B5EF4-FFF2-40B4-BE49-F238E27FC236}">
+                <a16:creationId xmlns:a16="http://schemas.microsoft.com/office/drawing/2014/main" id="{9613CAC1-7195-684D-AF43-CF2F7E1CD73B}"/>
+              </a:ext>
+            </a:extLst>
+          </p:cNvPr>
+          <p:cNvCxnSpPr>
+            <a:cxnSpLocks/>
+          </p:cNvCxnSpPr>
+          <p:nvPr/>
+        </p:nvCxnSpPr>
+        <p:spPr>
+          <a:xfrm flipH="1">
+            <a:off x="8645236" y="4707577"/>
+            <a:ext cx="910334" cy="859139"/>
+          </a:xfrm>
+          <a:prstGeom prst="straightConnector1">
+            <a:avLst/>
+          </a:prstGeom>
+          <a:ln>
+            <a:solidFill>
+              <a:schemeClr val="tx1"/>
+            </a:solidFill>
+            <a:tailEnd type="triangle"/>
+          </a:ln>
+        </p:spPr>
+        <p:style>
+          <a:lnRef idx="1">
+            <a:schemeClr val="accent1"/>
+          </a:lnRef>
+          <a:fillRef idx="0">
+            <a:schemeClr val="accent1"/>
+          </a:fillRef>
+          <a:effectRef idx="0">
+            <a:schemeClr val="accent1"/>
+          </a:effectRef>
+          <a:fontRef idx="minor">
+            <a:schemeClr val="tx1"/>
+          </a:fontRef>
+        </p:style>
+      </p:cxnSp>
+      <p:sp>
+        <p:nvSpPr>
+          <p:cNvPr id="58" name="TextBox 28">
+            <a:extLst>
+              <a:ext uri="{FF2B5EF4-FFF2-40B4-BE49-F238E27FC236}">
+                <a16:creationId xmlns:a16="http://schemas.microsoft.com/office/drawing/2014/main" id="{1F5B14A8-29C7-E340-ABFA-3954C20A3032}"/>
+              </a:ext>
+            </a:extLst>
+          </p:cNvPr>
+          <p:cNvSpPr txBox="1"/>
+          <p:nvPr/>
+        </p:nvSpPr>
+        <p:spPr>
+          <a:xfrm rot="19093082">
+            <a:off x="8281536" y="5006273"/>
+            <a:ext cx="1925781" cy="246221"/>
+          </a:xfrm>
+          <a:prstGeom prst="rect">
+            <a:avLst/>
+          </a:prstGeom>
+          <a:noFill/>
+        </p:spPr>
+        <p:txBody>
+          <a:bodyPr wrap="square" rtlCol="0">
+            <a:spAutoFit/>
+          </a:bodyPr>
+          <a:lstStyle/>
+          <a:p>
+            <a:pPr algn="ctr"/>
+            <a:r>
+              <a:rPr lang="en-US" sz="1000" dirty="0">
+                <a:latin typeface="Arial" panose="020B0604020202020204" pitchFamily="34" charset="0"/>
+                <a:cs typeface="Arial" panose="020B0604020202020204" pitchFamily="34" charset="0"/>
+              </a:rPr>
+              <a:t>chloramphenicol</a:t>
+            </a:r>
+          </a:p>
+        </p:txBody>
+      </p:sp>
     </p:spTree>
     <p:extLst>
       <p:ext uri="{BB962C8B-B14F-4D97-AF65-F5344CB8AC3E}">
-        <p14:creationId xmlns:p14="http://schemas.microsoft.com/office/powerpoint/2010/main" val="4094008024"/>
+        <p14:creationId xmlns:p14="http://schemas.microsoft.com/office/powerpoint/2010/main" val="3516146898"/>
       </p:ext>
     </p:extLst>
   </p:cSld>

</xml_diff>